<commit_message>
update G and D model
</commit_message>
<xml_diff>
--- a/GAN.pptx
+++ b/GAN.pptx
@@ -104,6 +104,11 @@
       </a:defRPr>
     </a:lvl9pPr>
   </p:defaultTextStyle>
+  <p:extLst>
+    <p:ext uri="{EFAFB233-063F-42B5-8137-9DF3F51BA10A}">
+      <p15:sldGuideLst xmlns:p15="http://schemas.microsoft.com/office/powerpoint/2012/main"/>
+    </p:ext>
+  </p:extLst>
 </p:presentation>
 </file>
 
@@ -254,7 +259,7 @@
           <a:p>
             <a:fld id="{E3F81D44-627A-45F2-8B44-6D7CD86F928F}" type="datetimeFigureOut">
               <a:rPr lang="en-US" smtClean="0"/>
-              <a:t>4/9/2020</a:t>
+              <a:t>4/10/2020</a:t>
             </a:fld>
             <a:endParaRPr lang="en-US"/>
           </a:p>
@@ -452,7 +457,7 @@
           <a:p>
             <a:fld id="{E3F81D44-627A-45F2-8B44-6D7CD86F928F}" type="datetimeFigureOut">
               <a:rPr lang="en-US" smtClean="0"/>
-              <a:t>4/9/2020</a:t>
+              <a:t>4/10/2020</a:t>
             </a:fld>
             <a:endParaRPr lang="en-US"/>
           </a:p>
@@ -660,7 +665,7 @@
           <a:p>
             <a:fld id="{E3F81D44-627A-45F2-8B44-6D7CD86F928F}" type="datetimeFigureOut">
               <a:rPr lang="en-US" smtClean="0"/>
-              <a:t>4/9/2020</a:t>
+              <a:t>4/10/2020</a:t>
             </a:fld>
             <a:endParaRPr lang="en-US"/>
           </a:p>
@@ -858,7 +863,7 @@
           <a:p>
             <a:fld id="{E3F81D44-627A-45F2-8B44-6D7CD86F928F}" type="datetimeFigureOut">
               <a:rPr lang="en-US" smtClean="0"/>
-              <a:t>4/9/2020</a:t>
+              <a:t>4/10/2020</a:t>
             </a:fld>
             <a:endParaRPr lang="en-US"/>
           </a:p>
@@ -1133,7 +1138,7 @@
           <a:p>
             <a:fld id="{E3F81D44-627A-45F2-8B44-6D7CD86F928F}" type="datetimeFigureOut">
               <a:rPr lang="en-US" smtClean="0"/>
-              <a:t>4/9/2020</a:t>
+              <a:t>4/10/2020</a:t>
             </a:fld>
             <a:endParaRPr lang="en-US"/>
           </a:p>
@@ -1398,7 +1403,7 @@
           <a:p>
             <a:fld id="{E3F81D44-627A-45F2-8B44-6D7CD86F928F}" type="datetimeFigureOut">
               <a:rPr lang="en-US" smtClean="0"/>
-              <a:t>4/9/2020</a:t>
+              <a:t>4/10/2020</a:t>
             </a:fld>
             <a:endParaRPr lang="en-US"/>
           </a:p>
@@ -1810,7 +1815,7 @@
           <a:p>
             <a:fld id="{E3F81D44-627A-45F2-8B44-6D7CD86F928F}" type="datetimeFigureOut">
               <a:rPr lang="en-US" smtClean="0"/>
-              <a:t>4/9/2020</a:t>
+              <a:t>4/10/2020</a:t>
             </a:fld>
             <a:endParaRPr lang="en-US"/>
           </a:p>
@@ -1951,7 +1956,7 @@
           <a:p>
             <a:fld id="{E3F81D44-627A-45F2-8B44-6D7CD86F928F}" type="datetimeFigureOut">
               <a:rPr lang="en-US" smtClean="0"/>
-              <a:t>4/9/2020</a:t>
+              <a:t>4/10/2020</a:t>
             </a:fld>
             <a:endParaRPr lang="en-US"/>
           </a:p>
@@ -2064,7 +2069,7 @@
           <a:p>
             <a:fld id="{E3F81D44-627A-45F2-8B44-6D7CD86F928F}" type="datetimeFigureOut">
               <a:rPr lang="en-US" smtClean="0"/>
-              <a:t>4/9/2020</a:t>
+              <a:t>4/10/2020</a:t>
             </a:fld>
             <a:endParaRPr lang="en-US"/>
           </a:p>
@@ -2375,7 +2380,7 @@
           <a:p>
             <a:fld id="{E3F81D44-627A-45F2-8B44-6D7CD86F928F}" type="datetimeFigureOut">
               <a:rPr lang="en-US" smtClean="0"/>
-              <a:t>4/9/2020</a:t>
+              <a:t>4/10/2020</a:t>
             </a:fld>
             <a:endParaRPr lang="en-US"/>
           </a:p>
@@ -2663,7 +2668,7 @@
           <a:p>
             <a:fld id="{E3F81D44-627A-45F2-8B44-6D7CD86F928F}" type="datetimeFigureOut">
               <a:rPr lang="en-US" smtClean="0"/>
-              <a:t>4/9/2020</a:t>
+              <a:t>4/10/2020</a:t>
             </a:fld>
             <a:endParaRPr lang="en-US"/>
           </a:p>
@@ -2904,7 +2909,7 @@
           <a:p>
             <a:fld id="{E3F81D44-627A-45F2-8B44-6D7CD86F928F}" type="datetimeFigureOut">
               <a:rPr lang="en-US" smtClean="0"/>
-              <a:t>4/9/2020</a:t>
+              <a:t>4/10/2020</a:t>
             </a:fld>
             <a:endParaRPr lang="en-US"/>
           </a:p>
@@ -3429,36 +3434,6 @@
           </a:prstGeom>
         </p:spPr>
       </p:pic>
-      <p:pic>
-        <p:nvPicPr>
-          <p:cNvPr id="11" name="Picture 10">
-            <a:extLst>
-              <a:ext uri="{FF2B5EF4-FFF2-40B4-BE49-F238E27FC236}">
-                <a16:creationId xmlns:a16="http://schemas.microsoft.com/office/drawing/2014/main" id="{BEB00572-CA1D-4C0F-A048-03D88047027B}"/>
-              </a:ext>
-            </a:extLst>
-          </p:cNvPr>
-          <p:cNvPicPr>
-            <a:picLocks noChangeAspect="1"/>
-          </p:cNvPicPr>
-          <p:nvPr/>
-        </p:nvPicPr>
-        <p:blipFill>
-          <a:blip r:embed="rId5"/>
-          <a:stretch>
-            <a:fillRect/>
-          </a:stretch>
-        </p:blipFill>
-        <p:spPr>
-          <a:xfrm>
-            <a:off x="1600200" y="2157412"/>
-            <a:ext cx="1066800" cy="4314825"/>
-          </a:xfrm>
-          <a:prstGeom prst="rect">
-            <a:avLst/>
-          </a:prstGeom>
-        </p:spPr>
-      </p:pic>
       <p:sp>
         <p:nvSpPr>
           <p:cNvPr id="12" name="Plus Sign 11">
@@ -3520,13 +3495,13 @@
           <p:nvPr/>
         </p:nvPicPr>
         <p:blipFill>
-          <a:blip r:embed="rId6">
+          <a:blip r:embed="rId5">
             <a:extLst>
               <a:ext uri="{28A0092B-C50C-407E-A947-70E740481C1C}">
                 <a14:useLocalDpi xmlns:a14="http://schemas.microsoft.com/office/drawing/2010/main" val="0"/>
               </a:ext>
               <a:ext uri="{837473B0-CC2E-450A-ABE3-18F120FF3D39}">
-                <a1611:picAttrSrcUrl xmlns:a1611="http://schemas.microsoft.com/office/drawing/2016/11/main" r:id="rId7"/>
+                <a1611:picAttrSrcUrl xmlns:a1611="http://schemas.microsoft.com/office/drawing/2016/11/main" r:id="rId6"/>
               </a:ext>
             </a:extLst>
           </a:blip>
@@ -3574,7 +3549,7 @@
           <a:p>
             <a:r>
               <a:rPr lang="en-US" sz="900">
-                <a:hlinkClick r:id="rId7" tooltip="https://en.wikipedia.org/wiki/White_noise"/>
+                <a:hlinkClick r:id="rId6" tooltip="https://en.wikipedia.org/wiki/White_noise"/>
               </a:rPr>
               <a:t>This Photo</a:t>
             </a:r>
@@ -3584,7 +3559,7 @@
             </a:r>
             <a:r>
               <a:rPr lang="en-US" sz="900">
-                <a:hlinkClick r:id="rId8" tooltip="https://creativecommons.org/licenses/by-sa/3.0/"/>
+                <a:hlinkClick r:id="rId7" tooltip="https://creativecommons.org/licenses/by-sa/3.0/"/>
               </a:rPr>
               <a:t>CC BY-SA</a:t>
             </a:r>
@@ -4283,6 +4258,133 @@
             <a:r>
               <a:rPr lang="en-US" dirty="0"/>
               <a:t>Real Samples</a:t>
+            </a:r>
+          </a:p>
+        </p:txBody>
+      </p:sp>
+      <p:pic>
+        <p:nvPicPr>
+          <p:cNvPr id="8" name="Picture 7">
+            <a:extLst>
+              <a:ext uri="{FF2B5EF4-FFF2-40B4-BE49-F238E27FC236}">
+                <a16:creationId xmlns:a16="http://schemas.microsoft.com/office/drawing/2014/main" id="{B55ED00B-92B7-4448-9D6E-2BC8045EAD3D}"/>
+              </a:ext>
+            </a:extLst>
+          </p:cNvPr>
+          <p:cNvPicPr>
+            <a:picLocks noChangeAspect="1"/>
+          </p:cNvPicPr>
+          <p:nvPr/>
+        </p:nvPicPr>
+        <p:blipFill>
+          <a:blip r:embed="rId8">
+            <a:extLst>
+              <a:ext uri="{28A0092B-C50C-407E-A947-70E740481C1C}">
+                <a14:useLocalDpi xmlns:a14="http://schemas.microsoft.com/office/drawing/2010/main" val="0"/>
+              </a:ext>
+            </a:extLst>
+          </a:blip>
+          <a:stretch>
+            <a:fillRect/>
+          </a:stretch>
+        </p:blipFill>
+        <p:spPr>
+          <a:xfrm>
+            <a:off x="854528" y="3468414"/>
+            <a:ext cx="1458241" cy="1447948"/>
+          </a:xfrm>
+          <a:prstGeom prst="rect">
+            <a:avLst/>
+          </a:prstGeom>
+        </p:spPr>
+      </p:pic>
+      <p:sp>
+        <p:nvSpPr>
+          <p:cNvPr id="10" name="TextBox 9">
+            <a:extLst>
+              <a:ext uri="{FF2B5EF4-FFF2-40B4-BE49-F238E27FC236}">
+                <a16:creationId xmlns:a16="http://schemas.microsoft.com/office/drawing/2014/main" id="{5839FB95-F407-44DC-9D4C-61053EAD8364}"/>
+              </a:ext>
+            </a:extLst>
+          </p:cNvPr>
+          <p:cNvSpPr txBox="1"/>
+          <p:nvPr/>
+        </p:nvSpPr>
+        <p:spPr>
+          <a:xfrm>
+            <a:off x="958788" y="3178206"/>
+            <a:ext cx="2485746" cy="369332"/>
+          </a:xfrm>
+          <a:prstGeom prst="rect">
+            <a:avLst/>
+          </a:prstGeom>
+          <a:noFill/>
+        </p:spPr>
+        <p:txBody>
+          <a:bodyPr wrap="square" rtlCol="0">
+            <a:spAutoFit/>
+          </a:bodyPr>
+          <a:lstStyle/>
+          <a:p>
+            <a:r>
+              <a:rPr lang="en-US" dirty="0"/>
+              <a:t>Latent Space</a:t>
+            </a:r>
+          </a:p>
+        </p:txBody>
+      </p:sp>
+      <p:sp>
+        <p:nvSpPr>
+          <p:cNvPr id="13" name="TextBox 12">
+            <a:extLst>
+              <a:ext uri="{FF2B5EF4-FFF2-40B4-BE49-F238E27FC236}">
+                <a16:creationId xmlns:a16="http://schemas.microsoft.com/office/drawing/2014/main" id="{21903E73-ECD9-44DF-A8D5-208F8638A44E}"/>
+              </a:ext>
+            </a:extLst>
+          </p:cNvPr>
+          <p:cNvSpPr txBox="1"/>
+          <p:nvPr/>
+        </p:nvSpPr>
+        <p:spPr>
+          <a:xfrm flipH="1">
+            <a:off x="452760" y="6383045"/>
+            <a:ext cx="11058851" cy="230832"/>
+          </a:xfrm>
+          <a:prstGeom prst="rect">
+            <a:avLst/>
+          </a:prstGeom>
+          <a:noFill/>
+        </p:spPr>
+        <p:txBody>
+          <a:bodyPr wrap="square" rtlCol="0">
+            <a:spAutoFit/>
+          </a:bodyPr>
+          <a:lstStyle/>
+          <a:p>
+            <a:pPr algn="ctr"/>
+            <a:r>
+              <a:rPr lang="en-US" sz="900" dirty="0"/>
+              <a:t>Latent space image source: Davidson, Tim R., et al. "</a:t>
+            </a:r>
+            <a:r>
+              <a:rPr lang="en-US" sz="900" dirty="0" err="1"/>
+              <a:t>Hyperspherical</a:t>
+            </a:r>
+            <a:r>
+              <a:rPr lang="en-US" sz="900" dirty="0"/>
+              <a:t> variational auto-encoders." </a:t>
+            </a:r>
+            <a:r>
+              <a:rPr lang="en-US" sz="900" i="1" dirty="0" err="1"/>
+              <a:t>arXiv</a:t>
+            </a:r>
+            <a:r>
+              <a:rPr lang="en-US" sz="900" i="1" dirty="0"/>
+              <a:t> preprint arXiv:1804.00891</a:t>
+            </a:r>
+            <a:r>
+              <a:rPr lang="en-US" sz="900" dirty="0"/>
+              <a:t> (2018).</a:t>
             </a:r>
           </a:p>
         </p:txBody>

</xml_diff>